<commit_message>
update to figure 2
</commit_message>
<xml_diff>
--- a/DATA/assets/figures.pptx
+++ b/DATA/assets/figures.pptx
@@ -247,7 +247,7 @@
           <a:p>
             <a:fld id="{CF10BF42-7994-45C5-A554-826BFA7A9881}" type="datetimeFigureOut">
               <a:rPr lang="en-US" smtClean="0"/>
-              <a:t>3/26/2019</a:t>
+              <a:t>3/27/2019</a:t>
             </a:fld>
             <a:endParaRPr lang="en-US"/>
           </a:p>
@@ -417,7 +417,7 @@
           <a:p>
             <a:fld id="{CF10BF42-7994-45C5-A554-826BFA7A9881}" type="datetimeFigureOut">
               <a:rPr lang="en-US" smtClean="0"/>
-              <a:t>3/26/2019</a:t>
+              <a:t>3/27/2019</a:t>
             </a:fld>
             <a:endParaRPr lang="en-US"/>
           </a:p>
@@ -597,7 +597,7 @@
           <a:p>
             <a:fld id="{CF10BF42-7994-45C5-A554-826BFA7A9881}" type="datetimeFigureOut">
               <a:rPr lang="en-US" smtClean="0"/>
-              <a:t>3/26/2019</a:t>
+              <a:t>3/27/2019</a:t>
             </a:fld>
             <a:endParaRPr lang="en-US"/>
           </a:p>
@@ -767,7 +767,7 @@
           <a:p>
             <a:fld id="{CF10BF42-7994-45C5-A554-826BFA7A9881}" type="datetimeFigureOut">
               <a:rPr lang="en-US" smtClean="0"/>
-              <a:t>3/26/2019</a:t>
+              <a:t>3/27/2019</a:t>
             </a:fld>
             <a:endParaRPr lang="en-US"/>
           </a:p>
@@ -1013,7 +1013,7 @@
           <a:p>
             <a:fld id="{CF10BF42-7994-45C5-A554-826BFA7A9881}" type="datetimeFigureOut">
               <a:rPr lang="en-US" smtClean="0"/>
-              <a:t>3/26/2019</a:t>
+              <a:t>3/27/2019</a:t>
             </a:fld>
             <a:endParaRPr lang="en-US"/>
           </a:p>
@@ -1245,7 +1245,7 @@
           <a:p>
             <a:fld id="{CF10BF42-7994-45C5-A554-826BFA7A9881}" type="datetimeFigureOut">
               <a:rPr lang="en-US" smtClean="0"/>
-              <a:t>3/26/2019</a:t>
+              <a:t>3/27/2019</a:t>
             </a:fld>
             <a:endParaRPr lang="en-US"/>
           </a:p>
@@ -1612,7 +1612,7 @@
           <a:p>
             <a:fld id="{CF10BF42-7994-45C5-A554-826BFA7A9881}" type="datetimeFigureOut">
               <a:rPr lang="en-US" smtClean="0"/>
-              <a:t>3/26/2019</a:t>
+              <a:t>3/27/2019</a:t>
             </a:fld>
             <a:endParaRPr lang="en-US"/>
           </a:p>
@@ -1730,7 +1730,7 @@
           <a:p>
             <a:fld id="{CF10BF42-7994-45C5-A554-826BFA7A9881}" type="datetimeFigureOut">
               <a:rPr lang="en-US" smtClean="0"/>
-              <a:t>3/26/2019</a:t>
+              <a:t>3/27/2019</a:t>
             </a:fld>
             <a:endParaRPr lang="en-US"/>
           </a:p>
@@ -1825,7 +1825,7 @@
           <a:p>
             <a:fld id="{CF10BF42-7994-45C5-A554-826BFA7A9881}" type="datetimeFigureOut">
               <a:rPr lang="en-US" smtClean="0"/>
-              <a:t>3/26/2019</a:t>
+              <a:t>3/27/2019</a:t>
             </a:fld>
             <a:endParaRPr lang="en-US"/>
           </a:p>
@@ -2102,7 +2102,7 @@
           <a:p>
             <a:fld id="{CF10BF42-7994-45C5-A554-826BFA7A9881}" type="datetimeFigureOut">
               <a:rPr lang="en-US" smtClean="0"/>
-              <a:t>3/26/2019</a:t>
+              <a:t>3/27/2019</a:t>
             </a:fld>
             <a:endParaRPr lang="en-US"/>
           </a:p>
@@ -2355,7 +2355,7 @@
           <a:p>
             <a:fld id="{CF10BF42-7994-45C5-A554-826BFA7A9881}" type="datetimeFigureOut">
               <a:rPr lang="en-US" smtClean="0"/>
-              <a:t>3/26/2019</a:t>
+              <a:t>3/27/2019</a:t>
             </a:fld>
             <a:endParaRPr lang="en-US"/>
           </a:p>
@@ -2568,7 +2568,7 @@
           <a:p>
             <a:fld id="{CF10BF42-7994-45C5-A554-826BFA7A9881}" type="datetimeFigureOut">
               <a:rPr lang="en-US" smtClean="0"/>
-              <a:t>3/26/2019</a:t>
+              <a:t>3/27/2019</a:t>
             </a:fld>
             <a:endParaRPr lang="en-US"/>
           </a:p>
@@ -12753,8 +12753,8 @@
           </p:nvSpPr>
           <p:spPr>
             <a:xfrm>
-              <a:off x="8648487" y="4973215"/>
-              <a:ext cx="1648272" cy="923330"/>
+              <a:off x="8638068" y="4973215"/>
+              <a:ext cx="1669111" cy="923330"/>
             </a:xfrm>
             <a:prstGeom prst="rect">
               <a:avLst/>
@@ -12784,7 +12784,11 @@
               <a:pPr algn="ctr"/>
               <a:r>
                 <a:rPr lang="en-US" dirty="0" smtClean="0"/>
-                <a:t>(demographics)</a:t>
+                <a:t>(Demographics</a:t>
+              </a:r>
+              <a:r>
+                <a:rPr lang="en-US" dirty="0" smtClean="0"/>
+                <a:t>)</a:t>
               </a:r>
               <a:endParaRPr lang="en-US" dirty="0"/>
             </a:p>
@@ -12815,7 +12819,11 @@
               <a:pPr algn="ctr"/>
               <a:r>
                 <a:rPr lang="en-US" dirty="0" smtClean="0"/>
-                <a:t>Unit of Observation (Missions)</a:t>
+                <a:t>Unit of Observation </a:t>
+              </a:r>
+              <a:r>
+                <a:rPr lang="en-US" dirty="0" smtClean="0"/>
+                <a:t>(Nonprofits)</a:t>
               </a:r>
               <a:endParaRPr lang="en-US" dirty="0"/>
             </a:p>

</xml_diff>